<commit_message>
Added links to README.md file.
</commit_message>
<xml_diff>
--- a/nutShell Presentation Slides.pptx
+++ b/nutShell Presentation Slides.pptx
@@ -114,6 +114,11 @@
       </a:defRPr>
     </a:lvl9pPr>
   </p:defaultTextStyle>
+  <p:extLst>
+    <p:ext uri="{EFAFB233-063F-42B5-8137-9DF3F51BA10A}">
+      <p15:sldGuideLst xmlns:p15="http://schemas.microsoft.com/office/powerpoint/2012/main"/>
+    </p:ext>
+  </p:extLst>
 </p:presentation>
 </file>
 
@@ -264,7 +269,7 @@
           <a:p>
             <a:fld id="{F18433F8-3384-4804-B1B3-3B4B3BACF04C}" type="datetimeFigureOut">
               <a:rPr lang="en-US" smtClean="0"/>
-              <a:t>6/7/2020</a:t>
+              <a:t>6/8/2020</a:t>
             </a:fld>
             <a:endParaRPr lang="en-US"/>
           </a:p>
@@ -462,7 +467,7 @@
           <a:p>
             <a:fld id="{F18433F8-3384-4804-B1B3-3B4B3BACF04C}" type="datetimeFigureOut">
               <a:rPr lang="en-US" smtClean="0"/>
-              <a:t>6/7/2020</a:t>
+              <a:t>6/8/2020</a:t>
             </a:fld>
             <a:endParaRPr lang="en-US"/>
           </a:p>
@@ -670,7 +675,7 @@
           <a:p>
             <a:fld id="{F18433F8-3384-4804-B1B3-3B4B3BACF04C}" type="datetimeFigureOut">
               <a:rPr lang="en-US" smtClean="0"/>
-              <a:t>6/7/2020</a:t>
+              <a:t>6/8/2020</a:t>
             </a:fld>
             <a:endParaRPr lang="en-US"/>
           </a:p>
@@ -868,7 +873,7 @@
           <a:p>
             <a:fld id="{F18433F8-3384-4804-B1B3-3B4B3BACF04C}" type="datetimeFigureOut">
               <a:rPr lang="en-US" smtClean="0"/>
-              <a:t>6/7/2020</a:t>
+              <a:t>6/8/2020</a:t>
             </a:fld>
             <a:endParaRPr lang="en-US"/>
           </a:p>
@@ -1143,7 +1148,7 @@
           <a:p>
             <a:fld id="{F18433F8-3384-4804-B1B3-3B4B3BACF04C}" type="datetimeFigureOut">
               <a:rPr lang="en-US" smtClean="0"/>
-              <a:t>6/7/2020</a:t>
+              <a:t>6/8/2020</a:t>
             </a:fld>
             <a:endParaRPr lang="en-US"/>
           </a:p>
@@ -1408,7 +1413,7 @@
           <a:p>
             <a:fld id="{F18433F8-3384-4804-B1B3-3B4B3BACF04C}" type="datetimeFigureOut">
               <a:rPr lang="en-US" smtClean="0"/>
-              <a:t>6/7/2020</a:t>
+              <a:t>6/8/2020</a:t>
             </a:fld>
             <a:endParaRPr lang="en-US"/>
           </a:p>
@@ -1820,7 +1825,7 @@
           <a:p>
             <a:fld id="{F18433F8-3384-4804-B1B3-3B4B3BACF04C}" type="datetimeFigureOut">
               <a:rPr lang="en-US" smtClean="0"/>
-              <a:t>6/7/2020</a:t>
+              <a:t>6/8/2020</a:t>
             </a:fld>
             <a:endParaRPr lang="en-US"/>
           </a:p>
@@ -1961,7 +1966,7 @@
           <a:p>
             <a:fld id="{F18433F8-3384-4804-B1B3-3B4B3BACF04C}" type="datetimeFigureOut">
               <a:rPr lang="en-US" smtClean="0"/>
-              <a:t>6/7/2020</a:t>
+              <a:t>6/8/2020</a:t>
             </a:fld>
             <a:endParaRPr lang="en-US"/>
           </a:p>
@@ -2074,7 +2079,7 @@
           <a:p>
             <a:fld id="{F18433F8-3384-4804-B1B3-3B4B3BACF04C}" type="datetimeFigureOut">
               <a:rPr lang="en-US" smtClean="0"/>
-              <a:t>6/7/2020</a:t>
+              <a:t>6/8/2020</a:t>
             </a:fld>
             <a:endParaRPr lang="en-US"/>
           </a:p>
@@ -2385,7 +2390,7 @@
           <a:p>
             <a:fld id="{F18433F8-3384-4804-B1B3-3B4B3BACF04C}" type="datetimeFigureOut">
               <a:rPr lang="en-US" smtClean="0"/>
-              <a:t>6/7/2020</a:t>
+              <a:t>6/8/2020</a:t>
             </a:fld>
             <a:endParaRPr lang="en-US"/>
           </a:p>
@@ -2673,7 +2678,7 @@
           <a:p>
             <a:fld id="{F18433F8-3384-4804-B1B3-3B4B3BACF04C}" type="datetimeFigureOut">
               <a:rPr lang="en-US" smtClean="0"/>
-              <a:t>6/7/2020</a:t>
+              <a:t>6/8/2020</a:t>
             </a:fld>
             <a:endParaRPr lang="en-US"/>
           </a:p>
@@ -2914,7 +2919,7 @@
           <a:p>
             <a:fld id="{F18433F8-3384-4804-B1B3-3B4B3BACF04C}" type="datetimeFigureOut">
               <a:rPr lang="en-US" smtClean="0"/>
-              <a:t>6/7/2020</a:t>
+              <a:t>6/8/2020</a:t>
             </a:fld>
             <a:endParaRPr lang="en-US"/>
           </a:p>
@@ -9977,8 +9982,8 @@
         </p:nvSpPr>
         <p:spPr>
           <a:xfrm>
-            <a:off x="1895682" y="2540136"/>
-            <a:ext cx="6293523" cy="4708981"/>
+            <a:off x="1895682" y="2248161"/>
+            <a:ext cx="6293523" cy="5201424"/>
           </a:xfrm>
           <a:prstGeom prst="rect">
             <a:avLst/>
@@ -10024,6 +10029,18 @@
                 <a:latin typeface="Comic Book" panose="02000500000000000000" pitchFamily="2" charset="0"/>
               </a:rPr>
               <a:t>CSS3</a:t>
+            </a:r>
+          </a:p>
+          <a:p>
+            <a:pPr algn="ctr"/>
+            <a:r>
+              <a:rPr lang="en-US" sz="3200" dirty="0">
+                <a:solidFill>
+                  <a:schemeClr val="bg1"/>
+                </a:solidFill>
+                <a:latin typeface="Comic Book" panose="02000500000000000000" pitchFamily="2" charset="0"/>
+              </a:rPr>
+              <a:t>Bootstrap</a:t>
             </a:r>
           </a:p>
           <a:p>

</xml_diff>

<commit_message>
Tweaked the future development section of the PowerPoint files.
</commit_message>
<xml_diff>
--- a/nutShell Presentation Slides.pptx
+++ b/nutShell Presentation Slides.pptx
@@ -12422,7 +12422,7 @@
         </p:nvSpPr>
         <p:spPr>
           <a:xfrm>
-            <a:off x="1754149" y="280416"/>
+            <a:off x="1725175" y="366623"/>
             <a:ext cx="6576590" cy="6124754"/>
           </a:xfrm>
           <a:prstGeom prst="rect">
@@ -12483,7 +12483,7 @@
           <a:p>
             <a:pPr algn="ctr"/>
             <a:r>
-              <a:rPr lang="en-US" sz="2400" dirty="0">
+              <a:rPr lang="en-US" sz="2200" dirty="0">
                 <a:solidFill>
                   <a:schemeClr val="bg1"/>
                 </a:solidFill>
@@ -12494,7 +12494,7 @@
           </a:p>
           <a:p>
             <a:pPr algn="ctr"/>
-            <a:endParaRPr lang="en-US" sz="2400" dirty="0">
+            <a:endParaRPr lang="en-US" sz="2200" dirty="0">
               <a:solidFill>
                 <a:schemeClr val="bg1"/>
               </a:solidFill>
@@ -12507,7 +12507,7 @@
               <a:buChar char="-"/>
             </a:pPr>
             <a:r>
-              <a:rPr lang="en-US" sz="2400" dirty="0">
+              <a:rPr lang="en-US" sz="2200" dirty="0">
                 <a:solidFill>
                   <a:schemeClr val="bg1"/>
                 </a:solidFill>
@@ -12522,7 +12522,7 @@
               <a:buChar char="-"/>
             </a:pPr>
             <a:r>
-              <a:rPr lang="en-US" sz="2400" dirty="0">
+              <a:rPr lang="en-US" sz="2200" dirty="0">
                 <a:solidFill>
                   <a:schemeClr val="bg1"/>
                 </a:solidFill>
@@ -12537,7 +12537,7 @@
               <a:buChar char="-"/>
             </a:pPr>
             <a:r>
-              <a:rPr lang="en-US" sz="2400" dirty="0">
+              <a:rPr lang="en-US" sz="2200" dirty="0">
                 <a:solidFill>
                   <a:schemeClr val="bg1"/>
                 </a:solidFill>
@@ -12552,7 +12552,7 @@
               <a:buChar char="-"/>
             </a:pPr>
             <a:r>
-              <a:rPr lang="en-US" sz="2400" dirty="0">
+              <a:rPr lang="en-US" sz="2200" dirty="0">
                 <a:solidFill>
                   <a:schemeClr val="bg1"/>
                 </a:solidFill>
@@ -12567,7 +12567,7 @@
               <a:buChar char="-"/>
             </a:pPr>
             <a:r>
-              <a:rPr lang="en-US" sz="2400" dirty="0">
+              <a:rPr lang="en-US" sz="2200" dirty="0">
                 <a:solidFill>
                   <a:schemeClr val="bg1"/>
                 </a:solidFill>
@@ -12577,7 +12577,22 @@
             </a:r>
           </a:p>
           <a:p>
-            <a:endParaRPr lang="en-US" sz="2400" dirty="0">
+            <a:pPr marL="342900" indent="-342900">
+              <a:buFontTx/>
+              <a:buChar char="-"/>
+            </a:pPr>
+            <a:r>
+              <a:rPr lang="en-US" sz="2200" dirty="0">
+                <a:solidFill>
+                  <a:schemeClr val="bg1"/>
+                </a:solidFill>
+                <a:latin typeface="Comic Book" panose="02000500000000000000" pitchFamily="2" charset="0"/>
+              </a:rPr>
+              <a:t>User data stored in server database</a:t>
+            </a:r>
+          </a:p>
+          <a:p>
+            <a:endParaRPr lang="en-US" sz="2200" dirty="0">
               <a:solidFill>
                 <a:schemeClr val="bg1"/>
               </a:solidFill>
@@ -12587,7 +12602,7 @@
           <a:p>
             <a:pPr algn="ctr"/>
             <a:r>
-              <a:rPr lang="en-US" sz="2400" dirty="0">
+              <a:rPr lang="en-US" sz="2200" dirty="0">
                 <a:solidFill>
                   <a:schemeClr val="bg1"/>
                 </a:solidFill>
@@ -12599,7 +12614,7 @@
           <a:p>
             <a:pPr algn="ctr"/>
             <a:r>
-              <a:rPr lang="en-US" sz="2400" dirty="0">
+              <a:rPr lang="en-US" sz="2200" dirty="0">
                 <a:solidFill>
                   <a:schemeClr val="bg1"/>
                 </a:solidFill>

</xml_diff>